<commit_message>
Delete roomname Fix game controller test time sleep Modify UX doc API prefix (Every request is private request, publish/system/private/)
</commit_message>
<xml_diff>
--- a/doc/UX_document.pptx
+++ b/doc/UX_document.pptx
@@ -281,7 +281,7 @@
           <a:p>
             <a:fld id="{29D7F5FF-29A7-4E18-B99B-DE968AE8E284}" type="datetimeFigureOut">
               <a:rPr lang="ko-KR" altLang="en-US" smtClean="0"/>
-              <a:t>2022-12-23</a:t>
+              <a:t>2023-01-08</a:t>
             </a:fld>
             <a:endParaRPr lang="ko-KR" altLang="en-US"/>
           </a:p>
@@ -479,7 +479,7 @@
           <a:p>
             <a:fld id="{29D7F5FF-29A7-4E18-B99B-DE968AE8E284}" type="datetimeFigureOut">
               <a:rPr lang="ko-KR" altLang="en-US" smtClean="0"/>
-              <a:t>2022-12-23</a:t>
+              <a:t>2023-01-08</a:t>
             </a:fld>
             <a:endParaRPr lang="ko-KR" altLang="en-US"/>
           </a:p>
@@ -687,7 +687,7 @@
           <a:p>
             <a:fld id="{29D7F5FF-29A7-4E18-B99B-DE968AE8E284}" type="datetimeFigureOut">
               <a:rPr lang="ko-KR" altLang="en-US" smtClean="0"/>
-              <a:t>2022-12-23</a:t>
+              <a:t>2023-01-08</a:t>
             </a:fld>
             <a:endParaRPr lang="ko-KR" altLang="en-US"/>
           </a:p>
@@ -885,7 +885,7 @@
           <a:p>
             <a:fld id="{29D7F5FF-29A7-4E18-B99B-DE968AE8E284}" type="datetimeFigureOut">
               <a:rPr lang="ko-KR" altLang="en-US" smtClean="0"/>
-              <a:t>2022-12-23</a:t>
+              <a:t>2023-01-08</a:t>
             </a:fld>
             <a:endParaRPr lang="ko-KR" altLang="en-US"/>
           </a:p>
@@ -1160,7 +1160,7 @@
           <a:p>
             <a:fld id="{29D7F5FF-29A7-4E18-B99B-DE968AE8E284}" type="datetimeFigureOut">
               <a:rPr lang="ko-KR" altLang="en-US" smtClean="0"/>
-              <a:t>2022-12-23</a:t>
+              <a:t>2023-01-08</a:t>
             </a:fld>
             <a:endParaRPr lang="ko-KR" altLang="en-US"/>
           </a:p>
@@ -1425,7 +1425,7 @@
           <a:p>
             <a:fld id="{29D7F5FF-29A7-4E18-B99B-DE968AE8E284}" type="datetimeFigureOut">
               <a:rPr lang="ko-KR" altLang="en-US" smtClean="0"/>
-              <a:t>2022-12-23</a:t>
+              <a:t>2023-01-08</a:t>
             </a:fld>
             <a:endParaRPr lang="ko-KR" altLang="en-US"/>
           </a:p>
@@ -1837,7 +1837,7 @@
           <a:p>
             <a:fld id="{29D7F5FF-29A7-4E18-B99B-DE968AE8E284}" type="datetimeFigureOut">
               <a:rPr lang="ko-KR" altLang="en-US" smtClean="0"/>
-              <a:t>2022-12-23</a:t>
+              <a:t>2023-01-08</a:t>
             </a:fld>
             <a:endParaRPr lang="ko-KR" altLang="en-US"/>
           </a:p>
@@ -1978,7 +1978,7 @@
           <a:p>
             <a:fld id="{29D7F5FF-29A7-4E18-B99B-DE968AE8E284}" type="datetimeFigureOut">
               <a:rPr lang="ko-KR" altLang="en-US" smtClean="0"/>
-              <a:t>2022-12-23</a:t>
+              <a:t>2023-01-08</a:t>
             </a:fld>
             <a:endParaRPr lang="ko-KR" altLang="en-US"/>
           </a:p>
@@ -2091,7 +2091,7 @@
           <a:p>
             <a:fld id="{29D7F5FF-29A7-4E18-B99B-DE968AE8E284}" type="datetimeFigureOut">
               <a:rPr lang="ko-KR" altLang="en-US" smtClean="0"/>
-              <a:t>2022-12-23</a:t>
+              <a:t>2023-01-08</a:t>
             </a:fld>
             <a:endParaRPr lang="ko-KR" altLang="en-US"/>
           </a:p>
@@ -2402,7 +2402,7 @@
           <a:p>
             <a:fld id="{29D7F5FF-29A7-4E18-B99B-DE968AE8E284}" type="datetimeFigureOut">
               <a:rPr lang="ko-KR" altLang="en-US" smtClean="0"/>
-              <a:t>2022-12-23</a:t>
+              <a:t>2023-01-08</a:t>
             </a:fld>
             <a:endParaRPr lang="ko-KR" altLang="en-US"/>
           </a:p>
@@ -2690,7 +2690,7 @@
           <a:p>
             <a:fld id="{29D7F5FF-29A7-4E18-B99B-DE968AE8E284}" type="datetimeFigureOut">
               <a:rPr lang="ko-KR" altLang="en-US" smtClean="0"/>
-              <a:t>2022-12-23</a:t>
+              <a:t>2023-01-08</a:t>
             </a:fld>
             <a:endParaRPr lang="ko-KR" altLang="en-US"/>
           </a:p>
@@ -2931,7 +2931,7 @@
           <a:p>
             <a:fld id="{29D7F5FF-29A7-4E18-B99B-DE968AE8E284}" type="datetimeFigureOut">
               <a:rPr lang="ko-KR" altLang="en-US" smtClean="0"/>
-              <a:t>2022-12-23</a:t>
+              <a:t>2023-01-08</a:t>
             </a:fld>
             <a:endParaRPr lang="ko-KR" altLang="en-US"/>
           </a:p>
@@ -3601,7 +3601,7 @@
           <p:nvPr>
             <p:extLst>
               <p:ext uri="{D42A27DB-BD31-4B8C-83A1-F6EECF244321}">
-                <p14:modId xmlns:p14="http://schemas.microsoft.com/office/powerpoint/2010/main" val="1246495774"/>
+                <p14:modId xmlns:p14="http://schemas.microsoft.com/office/powerpoint/2010/main" val="1293711472"/>
               </p:ext>
             </p:extLst>
           </p:nvPr>
@@ -3810,7 +3810,7 @@
                           <a:ea typeface="Malgun Gothic Semilight" panose="020B0503020000020004" pitchFamily="34" charset="-127"/>
                           <a:cs typeface="Malgun Gothic Semilight" panose="020B0503020000020004" pitchFamily="34" charset="-127"/>
                         </a:rPr>
-                        <a:t>/publish/system/public/{roomId}</a:t>
+                        <a:t>/publish/system/private/{roomId}</a:t>
                       </a:r>
                     </a:p>
                   </a:txBody>
@@ -6489,7 +6489,7 @@
           <p:nvPr>
             <p:extLst>
               <p:ext uri="{D42A27DB-BD31-4B8C-83A1-F6EECF244321}">
-                <p14:modId xmlns:p14="http://schemas.microsoft.com/office/powerpoint/2010/main" val="3816939746"/>
+                <p14:modId xmlns:p14="http://schemas.microsoft.com/office/powerpoint/2010/main" val="2042948873"/>
               </p:ext>
             </p:extLst>
           </p:nvPr>
@@ -6890,7 +6890,7 @@
                           <a:latin typeface="맑은 고딕" panose="020B0503020000020004" pitchFamily="50" charset="-127"/>
                           <a:ea typeface="맑은 고딕" panose="020B0503020000020004" pitchFamily="50" charset="-127"/>
                         </a:rPr>
-                        <a:t>"answer":true/false,"state":"PUBLISH_SCORE"</a:t>
+                        <a:t>"answer":true/false,"state":"PUBLISH_SCORE“, “keyword”:”apple”</a:t>
                       </a:r>
                       <a:r>
                         <a:rPr lang="en-US" sz="1100" b="0" i="0" u="none" strike="noStrike">

</xml_diff>

<commit_message>
Add new API for notify room owner to open liar
</commit_message>
<xml_diff>
--- a/doc/UX_document.pptx
+++ b/doc/UX_document.pptx
@@ -281,7 +281,7 @@
           <a:p>
             <a:fld id="{29D7F5FF-29A7-4E18-B99B-DE968AE8E284}" type="datetimeFigureOut">
               <a:rPr lang="ko-KR" altLang="en-US" smtClean="0"/>
-              <a:t>2023-01-08</a:t>
+              <a:t>2023-01-09</a:t>
             </a:fld>
             <a:endParaRPr lang="ko-KR" altLang="en-US"/>
           </a:p>
@@ -479,7 +479,7 @@
           <a:p>
             <a:fld id="{29D7F5FF-29A7-4E18-B99B-DE968AE8E284}" type="datetimeFigureOut">
               <a:rPr lang="ko-KR" altLang="en-US" smtClean="0"/>
-              <a:t>2023-01-08</a:t>
+              <a:t>2023-01-09</a:t>
             </a:fld>
             <a:endParaRPr lang="ko-KR" altLang="en-US"/>
           </a:p>
@@ -687,7 +687,7 @@
           <a:p>
             <a:fld id="{29D7F5FF-29A7-4E18-B99B-DE968AE8E284}" type="datetimeFigureOut">
               <a:rPr lang="ko-KR" altLang="en-US" smtClean="0"/>
-              <a:t>2023-01-08</a:t>
+              <a:t>2023-01-09</a:t>
             </a:fld>
             <a:endParaRPr lang="ko-KR" altLang="en-US"/>
           </a:p>
@@ -885,7 +885,7 @@
           <a:p>
             <a:fld id="{29D7F5FF-29A7-4E18-B99B-DE968AE8E284}" type="datetimeFigureOut">
               <a:rPr lang="ko-KR" altLang="en-US" smtClean="0"/>
-              <a:t>2023-01-08</a:t>
+              <a:t>2023-01-09</a:t>
             </a:fld>
             <a:endParaRPr lang="ko-KR" altLang="en-US"/>
           </a:p>
@@ -1160,7 +1160,7 @@
           <a:p>
             <a:fld id="{29D7F5FF-29A7-4E18-B99B-DE968AE8E284}" type="datetimeFigureOut">
               <a:rPr lang="ko-KR" altLang="en-US" smtClean="0"/>
-              <a:t>2023-01-08</a:t>
+              <a:t>2023-01-09</a:t>
             </a:fld>
             <a:endParaRPr lang="ko-KR" altLang="en-US"/>
           </a:p>
@@ -1425,7 +1425,7 @@
           <a:p>
             <a:fld id="{29D7F5FF-29A7-4E18-B99B-DE968AE8E284}" type="datetimeFigureOut">
               <a:rPr lang="ko-KR" altLang="en-US" smtClean="0"/>
-              <a:t>2023-01-08</a:t>
+              <a:t>2023-01-09</a:t>
             </a:fld>
             <a:endParaRPr lang="ko-KR" altLang="en-US"/>
           </a:p>
@@ -1837,7 +1837,7 @@
           <a:p>
             <a:fld id="{29D7F5FF-29A7-4E18-B99B-DE968AE8E284}" type="datetimeFigureOut">
               <a:rPr lang="ko-KR" altLang="en-US" smtClean="0"/>
-              <a:t>2023-01-08</a:t>
+              <a:t>2023-01-09</a:t>
             </a:fld>
             <a:endParaRPr lang="ko-KR" altLang="en-US"/>
           </a:p>
@@ -1978,7 +1978,7 @@
           <a:p>
             <a:fld id="{29D7F5FF-29A7-4E18-B99B-DE968AE8E284}" type="datetimeFigureOut">
               <a:rPr lang="ko-KR" altLang="en-US" smtClean="0"/>
-              <a:t>2023-01-08</a:t>
+              <a:t>2023-01-09</a:t>
             </a:fld>
             <a:endParaRPr lang="ko-KR" altLang="en-US"/>
           </a:p>
@@ -2091,7 +2091,7 @@
           <a:p>
             <a:fld id="{29D7F5FF-29A7-4E18-B99B-DE968AE8E284}" type="datetimeFigureOut">
               <a:rPr lang="ko-KR" altLang="en-US" smtClean="0"/>
-              <a:t>2023-01-08</a:t>
+              <a:t>2023-01-09</a:t>
             </a:fld>
             <a:endParaRPr lang="ko-KR" altLang="en-US"/>
           </a:p>
@@ -2402,7 +2402,7 @@
           <a:p>
             <a:fld id="{29D7F5FF-29A7-4E18-B99B-DE968AE8E284}" type="datetimeFigureOut">
               <a:rPr lang="ko-KR" altLang="en-US" smtClean="0"/>
-              <a:t>2023-01-08</a:t>
+              <a:t>2023-01-09</a:t>
             </a:fld>
             <a:endParaRPr lang="ko-KR" altLang="en-US"/>
           </a:p>
@@ -2690,7 +2690,7 @@
           <a:p>
             <a:fld id="{29D7F5FF-29A7-4E18-B99B-DE968AE8E284}" type="datetimeFigureOut">
               <a:rPr lang="ko-KR" altLang="en-US" smtClean="0"/>
-              <a:t>2023-01-08</a:t>
+              <a:t>2023-01-09</a:t>
             </a:fld>
             <a:endParaRPr lang="ko-KR" altLang="en-US"/>
           </a:p>
@@ -2931,7 +2931,7 @@
           <a:p>
             <a:fld id="{29D7F5FF-29A7-4E18-B99B-DE968AE8E284}" type="datetimeFigureOut">
               <a:rPr lang="ko-KR" altLang="en-US" smtClean="0"/>
-              <a:t>2023-01-08</a:t>
+              <a:t>2023-01-09</a:t>
             </a:fld>
             <a:endParaRPr lang="ko-KR" altLang="en-US"/>
           </a:p>
@@ -5011,14 +5011,14 @@
           <p:nvPr>
             <p:extLst>
               <p:ext uri="{D42A27DB-BD31-4B8C-83A1-F6EECF244321}">
-                <p14:modId xmlns:p14="http://schemas.microsoft.com/office/powerpoint/2010/main" val="4148594683"/>
+                <p14:modId xmlns:p14="http://schemas.microsoft.com/office/powerpoint/2010/main" val="2529032873"/>
               </p:ext>
             </p:extLst>
           </p:nvPr>
         </p:nvGraphicFramePr>
         <p:xfrm>
-          <a:off x="6887361" y="2967605"/>
-          <a:ext cx="4717938" cy="3576844"/>
+          <a:off x="6876082" y="2369962"/>
+          <a:ext cx="4717938" cy="4370483"/>
         </p:xfrm>
         <a:graphic>
           <a:graphicData uri="http://schemas.openxmlformats.org/drawingml/2006/table">
@@ -5050,7 +5050,7 @@
                     <a:p>
                       <a:pPr latinLnBrk="1"/>
                       <a:r>
-                        <a:rPr lang="en-US" altLang="ko-KR" sz="1100">
+                        <a:rPr lang="en-US" altLang="ko-KR" sz="1000">
                           <a:latin typeface="+mj-lt"/>
                           <a:ea typeface="Malgun Gothic Semilight" panose="020B0503020000020004" pitchFamily="34" charset="-127"/>
                           <a:cs typeface="Malgun Gothic Semilight" panose="020B0503020000020004" pitchFamily="34" charset="-127"/>
@@ -5058,7 +5058,7 @@
                         <a:t>API</a:t>
                       </a:r>
                       <a:r>
-                        <a:rPr lang="ko-KR" altLang="en-US" sz="1100">
+                        <a:rPr lang="ko-KR" altLang="en-US" sz="1000">
                           <a:latin typeface="+mj-lt"/>
                           <a:ea typeface="Malgun Gothic Semilight" panose="020B0503020000020004" pitchFamily="34" charset="-127"/>
                           <a:cs typeface="Malgun Gothic Semilight" panose="020B0503020000020004" pitchFamily="34" charset="-127"/>
@@ -5066,14 +5066,14 @@
                         <a:t> </a:t>
                       </a:r>
                       <a:r>
-                        <a:rPr lang="en-US" altLang="ko-KR" sz="1100">
+                        <a:rPr lang="en-US" altLang="ko-KR" sz="1000">
                           <a:latin typeface="+mj-lt"/>
                           <a:ea typeface="Malgun Gothic Semilight" panose="020B0503020000020004" pitchFamily="34" charset="-127"/>
                           <a:cs typeface="Malgun Gothic Semilight" panose="020B0503020000020004" pitchFamily="34" charset="-127"/>
                         </a:rPr>
                         <a:t>call</a:t>
                       </a:r>
-                      <a:endParaRPr lang="ko-KR" altLang="en-US" sz="1100">
+                      <a:endParaRPr lang="ko-KR" altLang="en-US" sz="1000">
                         <a:latin typeface="+mj-lt"/>
                         <a:ea typeface="Malgun Gothic Semilight" panose="020B0503020000020004" pitchFamily="34" charset="-127"/>
                         <a:cs typeface="Malgun Gothic Semilight" panose="020B0503020000020004" pitchFamily="34" charset="-127"/>
@@ -5093,14 +5093,14 @@
                     <a:p>
                       <a:pPr latinLnBrk="1"/>
                       <a:r>
-                        <a:rPr lang="en-US" altLang="ko-KR" sz="1100">
+                        <a:rPr lang="en-US" altLang="ko-KR" sz="1000">
                           <a:latin typeface="+mj-lt"/>
                           <a:ea typeface="Malgun Gothic Semilight" panose="020B0503020000020004" pitchFamily="34" charset="-127"/>
                           <a:cs typeface="Malgun Gothic Semilight" panose="020B0503020000020004" pitchFamily="34" charset="-127"/>
                         </a:rPr>
                         <a:t>parameter</a:t>
                       </a:r>
-                      <a:endParaRPr lang="ko-KR" altLang="en-US" sz="1100">
+                      <a:endParaRPr lang="ko-KR" altLang="en-US" sz="1000">
                         <a:latin typeface="+mj-lt"/>
                         <a:ea typeface="Malgun Gothic Semilight" panose="020B0503020000020004" pitchFamily="34" charset="-127"/>
                         <a:cs typeface="Malgun Gothic Semilight" panose="020B0503020000020004" pitchFamily="34" charset="-127"/>
@@ -5143,7 +5143,7 @@
                         <a:defRPr/>
                       </a:pPr>
                       <a:r>
-                        <a:rPr lang="en-US" altLang="ko-KR" sz="1100">
+                        <a:rPr lang="en-US" altLang="ko-KR" sz="1000">
                           <a:latin typeface="+mj-lt"/>
                           <a:ea typeface="Malgun Gothic Semilight" panose="020B0503020000020004" pitchFamily="34" charset="-127"/>
                           <a:cs typeface="Malgun Gothic Semilight" panose="020B0503020000020004" pitchFamily="34" charset="-127"/>
@@ -5165,7 +5165,7 @@
                     <a:p>
                       <a:pPr algn="l" fontAlgn="ctr"/>
                       <a:r>
-                        <a:rPr lang="en-US" sz="1100" b="0" i="0" u="none" strike="noStrike">
+                        <a:rPr lang="en-US" sz="1000" b="0" i="0" u="none" strike="noStrike">
                           <a:solidFill>
                             <a:srgbClr val="000000"/>
                           </a:solidFill>
@@ -5176,7 +5176,7 @@
                         <a:t>{"senderId":"2c1c2918-98ba-4360-af3f-61984ebcc924", "message":{"method":"voteLiar", "body":{</a:t>
                       </a:r>
                       <a:r>
-                        <a:rPr lang="en-US" sz="1100" b="1" i="0" u="none" strike="noStrike">
+                        <a:rPr lang="en-US" sz="1000" b="1" i="0" u="none" strike="noStrike">
                           <a:solidFill>
                             <a:srgbClr val="000000"/>
                           </a:solidFill>
@@ -5187,7 +5187,7 @@
                         <a:t>"liar":"1b60ce03-8aba-48e5-82a9-dec28c03e6c6"</a:t>
                       </a:r>
                       <a:r>
-                        <a:rPr lang="en-US" sz="1100" b="0" i="0" u="none" strike="noStrike">
+                        <a:rPr lang="en-US" sz="1000" b="0" i="0" u="none" strike="noStrike">
                           <a:solidFill>
                             <a:srgbClr val="000000"/>
                           </a:solidFill>
@@ -5235,7 +5235,7 @@
                         <a:defRPr/>
                       </a:pPr>
                       <a:r>
-                        <a:rPr lang="en-US" altLang="ko-KR" sz="1100">
+                        <a:rPr lang="en-US" altLang="ko-KR" sz="1000">
                           <a:latin typeface="+mj-lt"/>
                           <a:ea typeface="Malgun Gothic Semilight" panose="020B0503020000020004" pitchFamily="34" charset="-127"/>
                           <a:cs typeface="Malgun Gothic Semilight" panose="020B0503020000020004" pitchFamily="34" charset="-127"/>
@@ -5257,7 +5257,7 @@
                     <a:p>
                       <a:pPr algn="l" fontAlgn="ctr"/>
                       <a:r>
-                        <a:rPr lang="en-US" sz="1100" b="0" i="0" u="none" strike="noStrike">
+                        <a:rPr lang="en-US" sz="1000" b="0" i="0" u="none" strike="noStrike">
                           <a:solidFill>
                             <a:srgbClr val="000000"/>
                           </a:solidFill>
@@ -5268,7 +5268,7 @@
                         <a:t>{"senderId":"SERVER", "message":{"method":"</a:t>
                       </a:r>
                       <a:r>
-                        <a:rPr lang="en-US" sz="1100" b="1" i="0" u="none" strike="noStrike">
+                        <a:rPr lang="en-US" sz="1000" b="1" i="0" u="none" strike="noStrike">
                           <a:solidFill>
                             <a:srgbClr val="000000"/>
                           </a:solidFill>
@@ -5279,7 +5279,7 @@
                         <a:t>notifyVoteResult</a:t>
                       </a:r>
                       <a:r>
-                        <a:rPr lang="en-US" sz="1100" b="0" i="0" u="none" strike="noStrike">
+                        <a:rPr lang="en-US" sz="1000" b="0" i="0" u="none" strike="noStrike">
                           <a:solidFill>
                             <a:srgbClr val="000000"/>
                           </a:solidFill>
@@ -5290,7 +5290,7 @@
                         <a:t>", "body":{</a:t>
                       </a:r>
                       <a:br>
-                        <a:rPr lang="en-US" sz="1100" b="0" i="0" u="none" strike="noStrike">
+                        <a:rPr lang="en-US" sz="1000" b="0" i="0" u="none" strike="noStrike">
                           <a:solidFill>
                             <a:srgbClr val="000000"/>
                           </a:solidFill>
@@ -5300,7 +5300,7 @@
                         </a:rPr>
                       </a:br>
                       <a:r>
-                        <a:rPr lang="en-US" sz="1100" b="1" i="0" u="none" strike="noStrike">
+                        <a:rPr lang="en-US" sz="1000" b="1" i="0" u="none" strike="noStrike">
                           <a:solidFill>
                             <a:srgbClr val="000000"/>
                           </a:solidFill>
@@ -5311,7 +5311,7 @@
                         <a:t>"voteResult":{"1b60ce03-8aba-48e5-82a9-dec28c03e6c6":"1b60ce03-8aba-48e5-82a9-dec28c03e6c6","2c1c2918-98ba-4360-af3f-61984ebcc924":"1b60ce03-8aba-48e5-82a9-dec28c03e6c6"},</a:t>
                       </a:r>
                       <a:br>
-                        <a:rPr lang="en-US" sz="1100" b="1" i="0" u="none" strike="noStrike">
+                        <a:rPr lang="en-US" sz="1000" b="1" i="0" u="none" strike="noStrike">
                           <a:solidFill>
                             <a:srgbClr val="000000"/>
                           </a:solidFill>
@@ -5321,7 +5321,7 @@
                         </a:rPr>
                       </a:br>
                       <a:r>
-                        <a:rPr lang="en-US" sz="1100" b="1" i="0" u="none" strike="noStrike">
+                        <a:rPr lang="en-US" sz="1000" b="1" i="0" u="none" strike="noStrike">
                           <a:solidFill>
                             <a:srgbClr val="000000"/>
                           </a:solidFill>
@@ -5332,7 +5332,7 @@
                         <a:t>"mostVoted":[{"1b60ce03-8aba-48e5-82a9-dec28c03e6c6":2}]}</a:t>
                       </a:r>
                       <a:r>
-                        <a:rPr lang="en-US" sz="1100" b="0" i="0" u="none" strike="noStrike">
+                        <a:rPr lang="en-US" sz="1000" b="0" i="0" u="none" strike="noStrike">
                           <a:solidFill>
                             <a:srgbClr val="000000"/>
                           </a:solidFill>
@@ -5353,6 +5353,76 @@
                 <a:extLst>
                   <a:ext uri="{0D108BD9-81ED-4DB2-BD59-A6C34878D82A}">
                     <a16:rowId xmlns:a16="http://schemas.microsoft.com/office/drawing/2014/main" val="3589446657"/>
+                  </a:ext>
+                </a:extLst>
+              </a:tr>
+              <a:tr h="1296559">
+                <a:tc>
+                  <a:txBody>
+                    <a:bodyPr/>
+                    <a:lstStyle/>
+                    <a:p>
+                      <a:pPr marL="0" marR="0" lvl="0" indent="0" algn="l" defTabSz="914400" rtl="0" eaLnBrk="1" fontAlgn="auto" latinLnBrk="1" hangingPunct="1">
+                        <a:lnSpc>
+                          <a:spcPct val="100000"/>
+                        </a:lnSpc>
+                        <a:spcBef>
+                          <a:spcPts val="0"/>
+                        </a:spcBef>
+                        <a:spcAft>
+                          <a:spcPts val="0"/>
+                        </a:spcAft>
+                        <a:buClrTx/>
+                        <a:buSzTx/>
+                        <a:buFontTx/>
+                        <a:buNone/>
+                        <a:tabLst/>
+                        <a:defRPr/>
+                      </a:pPr>
+                      <a:r>
+                        <a:rPr lang="en-US" altLang="ko-KR" sz="1000">
+                          <a:latin typeface="+mj-lt"/>
+                          <a:ea typeface="Malgun Gothic Semilight" panose="020B0503020000020004" pitchFamily="34" charset="-127"/>
+                          <a:cs typeface="Malgun Gothic Semilight" panose="020B0503020000020004" pitchFamily="34" charset="-127"/>
+                        </a:rPr>
+                        <a:t>/subscribe/system/public/{roomId}</a:t>
+                      </a:r>
+                    </a:p>
+                  </a:txBody>
+                  <a:tcPr>
+                    <a:solidFill>
+                      <a:srgbClr val="F3E7F8"/>
+                    </a:solidFill>
+                  </a:tcPr>
+                </a:tc>
+                <a:tc>
+                  <a:txBody>
+                    <a:bodyPr/>
+                    <a:lstStyle/>
+                    <a:p>
+                      <a:pPr algn="l" fontAlgn="ctr"/>
+                      <a:r>
+                        <a:rPr lang="en-US" sz="1000" b="0" i="0" u="none" strike="noStrike">
+                          <a:solidFill>
+                            <a:srgbClr val="000000"/>
+                          </a:solidFill>
+                          <a:effectLst/>
+                          <a:latin typeface="맑은 고딕" panose="020B0503020000020004" pitchFamily="50" charset="-127"/>
+                          <a:ea typeface="맑은 고딕" panose="020B0503020000020004" pitchFamily="50" charset="-127"/>
+                        </a:rPr>
+                        <a:t>{"senderId":"SERVER", "message":{"method":"notifyLiarOpenRequest", "body":GameStateResponse(state=OPEN_LIAR)}, "uuid":'b9464e28-51ad-45ae-ba99-977264d22cd3'}</a:t>
+                      </a:r>
+                    </a:p>
+                  </a:txBody>
+                  <a:tcPr marL="9525" marR="9525" marT="9525" marB="0" anchor="ctr">
+                    <a:solidFill>
+                      <a:srgbClr val="F3E7F8"/>
+                    </a:solidFill>
+                  </a:tcPr>
+                </a:tc>
+                <a:extLst>
+                  <a:ext uri="{0D108BD9-81ED-4DB2-BD59-A6C34878D82A}">
+                    <a16:rowId xmlns:a16="http://schemas.microsoft.com/office/drawing/2014/main" val="3411107468"/>
                   </a:ext>
                 </a:extLst>
               </a:tr>

</xml_diff>

<commit_message>
Modify message mapping prefix Add exception handler case
</commit_message>
<xml_diff>
--- a/doc/UX_document.pptx
+++ b/doc/UX_document.pptx
@@ -281,7 +281,7 @@
           <a:p>
             <a:fld id="{29D7F5FF-29A7-4E18-B99B-DE968AE8E284}" type="datetimeFigureOut">
               <a:rPr lang="ko-KR" altLang="en-US" smtClean="0"/>
-              <a:t>2023-01-09</a:t>
+              <a:t>2023-01-10</a:t>
             </a:fld>
             <a:endParaRPr lang="ko-KR" altLang="en-US"/>
           </a:p>
@@ -479,7 +479,7 @@
           <a:p>
             <a:fld id="{29D7F5FF-29A7-4E18-B99B-DE968AE8E284}" type="datetimeFigureOut">
               <a:rPr lang="ko-KR" altLang="en-US" smtClean="0"/>
-              <a:t>2023-01-09</a:t>
+              <a:t>2023-01-10</a:t>
             </a:fld>
             <a:endParaRPr lang="ko-KR" altLang="en-US"/>
           </a:p>
@@ -687,7 +687,7 @@
           <a:p>
             <a:fld id="{29D7F5FF-29A7-4E18-B99B-DE968AE8E284}" type="datetimeFigureOut">
               <a:rPr lang="ko-KR" altLang="en-US" smtClean="0"/>
-              <a:t>2023-01-09</a:t>
+              <a:t>2023-01-10</a:t>
             </a:fld>
             <a:endParaRPr lang="ko-KR" altLang="en-US"/>
           </a:p>
@@ -885,7 +885,7 @@
           <a:p>
             <a:fld id="{29D7F5FF-29A7-4E18-B99B-DE968AE8E284}" type="datetimeFigureOut">
               <a:rPr lang="ko-KR" altLang="en-US" smtClean="0"/>
-              <a:t>2023-01-09</a:t>
+              <a:t>2023-01-10</a:t>
             </a:fld>
             <a:endParaRPr lang="ko-KR" altLang="en-US"/>
           </a:p>
@@ -1160,7 +1160,7 @@
           <a:p>
             <a:fld id="{29D7F5FF-29A7-4E18-B99B-DE968AE8E284}" type="datetimeFigureOut">
               <a:rPr lang="ko-KR" altLang="en-US" smtClean="0"/>
-              <a:t>2023-01-09</a:t>
+              <a:t>2023-01-10</a:t>
             </a:fld>
             <a:endParaRPr lang="ko-KR" altLang="en-US"/>
           </a:p>
@@ -1425,7 +1425,7 @@
           <a:p>
             <a:fld id="{29D7F5FF-29A7-4E18-B99B-DE968AE8E284}" type="datetimeFigureOut">
               <a:rPr lang="ko-KR" altLang="en-US" smtClean="0"/>
-              <a:t>2023-01-09</a:t>
+              <a:t>2023-01-10</a:t>
             </a:fld>
             <a:endParaRPr lang="ko-KR" altLang="en-US"/>
           </a:p>
@@ -1837,7 +1837,7 @@
           <a:p>
             <a:fld id="{29D7F5FF-29A7-4E18-B99B-DE968AE8E284}" type="datetimeFigureOut">
               <a:rPr lang="ko-KR" altLang="en-US" smtClean="0"/>
-              <a:t>2023-01-09</a:t>
+              <a:t>2023-01-10</a:t>
             </a:fld>
             <a:endParaRPr lang="ko-KR" altLang="en-US"/>
           </a:p>
@@ -1978,7 +1978,7 @@
           <a:p>
             <a:fld id="{29D7F5FF-29A7-4E18-B99B-DE968AE8E284}" type="datetimeFigureOut">
               <a:rPr lang="ko-KR" altLang="en-US" smtClean="0"/>
-              <a:t>2023-01-09</a:t>
+              <a:t>2023-01-10</a:t>
             </a:fld>
             <a:endParaRPr lang="ko-KR" altLang="en-US"/>
           </a:p>
@@ -2091,7 +2091,7 @@
           <a:p>
             <a:fld id="{29D7F5FF-29A7-4E18-B99B-DE968AE8E284}" type="datetimeFigureOut">
               <a:rPr lang="ko-KR" altLang="en-US" smtClean="0"/>
-              <a:t>2023-01-09</a:t>
+              <a:t>2023-01-10</a:t>
             </a:fld>
             <a:endParaRPr lang="ko-KR" altLang="en-US"/>
           </a:p>
@@ -2402,7 +2402,7 @@
           <a:p>
             <a:fld id="{29D7F5FF-29A7-4E18-B99B-DE968AE8E284}" type="datetimeFigureOut">
               <a:rPr lang="ko-KR" altLang="en-US" smtClean="0"/>
-              <a:t>2023-01-09</a:t>
+              <a:t>2023-01-10</a:t>
             </a:fld>
             <a:endParaRPr lang="ko-KR" altLang="en-US"/>
           </a:p>
@@ -2690,7 +2690,7 @@
           <a:p>
             <a:fld id="{29D7F5FF-29A7-4E18-B99B-DE968AE8E284}" type="datetimeFigureOut">
               <a:rPr lang="ko-KR" altLang="en-US" smtClean="0"/>
-              <a:t>2023-01-09</a:t>
+              <a:t>2023-01-10</a:t>
             </a:fld>
             <a:endParaRPr lang="ko-KR" altLang="en-US"/>
           </a:p>
@@ -2931,7 +2931,7 @@
           <a:p>
             <a:fld id="{29D7F5FF-29A7-4E18-B99B-DE968AE8E284}" type="datetimeFigureOut">
               <a:rPr lang="ko-KR" altLang="en-US" smtClean="0"/>
-              <a:t>2023-01-09</a:t>
+              <a:t>2023-01-10</a:t>
             </a:fld>
             <a:endParaRPr lang="ko-KR" altLang="en-US"/>
           </a:p>
@@ -3810,7 +3810,7 @@
                           <a:ea typeface="Malgun Gothic Semilight" panose="020B0503020000020004" pitchFamily="34" charset="-127"/>
                           <a:cs typeface="Malgun Gothic Semilight" panose="020B0503020000020004" pitchFamily="34" charset="-127"/>
                         </a:rPr>
-                        <a:t>/publish/system/private/{roomId}</a:t>
+                        <a:t>/publish/private/{roomId}</a:t>
                       </a:r>
                     </a:p>
                   </a:txBody>
@@ -4017,7 +4017,7 @@
                           <a:ea typeface="Malgun Gothic Semilight" panose="020B0503020000020004" pitchFamily="34" charset="-127"/>
                           <a:cs typeface="Malgun Gothic Semilight" panose="020B0503020000020004" pitchFamily="34" charset="-127"/>
                         </a:rPr>
-                        <a:t>/subscribe/system/public/{roomId}</a:t>
+                        <a:t>/subscribe/public/{roomId}</a:t>
                       </a:r>
                     </a:p>
                   </a:txBody>
@@ -4218,7 +4218,7 @@
                           <a:ea typeface="Malgun Gothic Semilight" panose="020B0503020000020004" pitchFamily="34" charset="-127"/>
                           <a:cs typeface="Malgun Gothic Semilight" panose="020B0503020000020004" pitchFamily="34" charset="-127"/>
                         </a:rPr>
-                        <a:t>/subscribe/system/public/{roomId}</a:t>
+                        <a:t>/subscribe/public/{roomId}</a:t>
                       </a:r>
                       <a:endParaRPr lang="en-US" altLang="ko-KR" sz="1000">
                         <a:latin typeface="+mj-lt"/>
@@ -5148,7 +5148,7 @@
                           <a:ea typeface="Malgun Gothic Semilight" panose="020B0503020000020004" pitchFamily="34" charset="-127"/>
                           <a:cs typeface="Malgun Gothic Semilight" panose="020B0503020000020004" pitchFamily="34" charset="-127"/>
                         </a:rPr>
-                        <a:t>/publish/system/private/{roomId}</a:t>
+                        <a:t>/publish/private/{roomId}</a:t>
                       </a:r>
                     </a:p>
                   </a:txBody>
@@ -5240,7 +5240,7 @@
                           <a:ea typeface="Malgun Gothic Semilight" panose="020B0503020000020004" pitchFamily="34" charset="-127"/>
                           <a:cs typeface="Malgun Gothic Semilight" panose="020B0503020000020004" pitchFamily="34" charset="-127"/>
                         </a:rPr>
-                        <a:t>/subscribe/system/public/{roomId}</a:t>
+                        <a:t>/subscribe/public/{roomId}</a:t>
                       </a:r>
                     </a:p>
                   </a:txBody>
@@ -5385,7 +5385,7 @@
                           <a:ea typeface="Malgun Gothic Semilight" panose="020B0503020000020004" pitchFamily="34" charset="-127"/>
                           <a:cs typeface="Malgun Gothic Semilight" panose="020B0503020000020004" pitchFamily="34" charset="-127"/>
                         </a:rPr>
-                        <a:t>/subscribe/system/public/{roomId}</a:t>
+                        <a:t>/subscribe/public/{roomId}</a:t>
                       </a:r>
                     </a:p>
                   </a:txBody>
@@ -5742,7 +5742,7 @@
                           <a:ea typeface="Malgun Gothic Semilight" panose="020B0503020000020004" pitchFamily="34" charset="-127"/>
                           <a:cs typeface="Malgun Gothic Semilight" panose="020B0503020000020004" pitchFamily="34" charset="-127"/>
                         </a:rPr>
-                        <a:t>/publish/system/private/{roomId}</a:t>
+                        <a:t>/publish/private/{roomId}</a:t>
                       </a:r>
                     </a:p>
                   </a:txBody>
@@ -5834,7 +5834,7 @@
                           <a:ea typeface="Malgun Gothic Semilight" panose="020B0503020000020004" pitchFamily="34" charset="-127"/>
                           <a:cs typeface="Malgun Gothic Semilight" panose="020B0503020000020004" pitchFamily="34" charset="-127"/>
                         </a:rPr>
-                        <a:t>/subscribe/system/public/{roomId}</a:t>
+                        <a:t>/subscribe/public/{roomId}</a:t>
                       </a:r>
                     </a:p>
                   </a:txBody>
@@ -6696,7 +6696,7 @@
                           <a:ea typeface="Malgun Gothic Semilight" panose="020B0503020000020004" pitchFamily="34" charset="-127"/>
                           <a:cs typeface="Malgun Gothic Semilight" panose="020B0503020000020004" pitchFamily="34" charset="-127"/>
                         </a:rPr>
-                        <a:t>/subscribe/system/private/{liarId}</a:t>
+                        <a:t>/subscribe/private/{liarId}</a:t>
                       </a:r>
                     </a:p>
                   </a:txBody>
@@ -6788,7 +6788,7 @@
                           <a:ea typeface="Malgun Gothic Semilight" panose="020B0503020000020004" pitchFamily="34" charset="-127"/>
                           <a:cs typeface="Malgun Gothic Semilight" panose="020B0503020000020004" pitchFamily="34" charset="-127"/>
                         </a:rPr>
-                        <a:t>/publish/system/private/{roomId}</a:t>
+                        <a:t>/publish/private/{roomId}</a:t>
                       </a:r>
                     </a:p>
                   </a:txBody>
@@ -6902,7 +6902,7 @@
                           <a:ea typeface="Malgun Gothic Semilight" panose="020B0503020000020004" pitchFamily="34" charset="-127"/>
                           <a:cs typeface="Malgun Gothic Semilight" panose="020B0503020000020004" pitchFamily="34" charset="-127"/>
                         </a:rPr>
-                        <a:t>/subscribe/system/public/{roomId}</a:t>
+                        <a:t>/subscribe/public/{roomId}</a:t>
                       </a:r>
                     </a:p>
                   </a:txBody>
@@ -7306,7 +7306,7 @@
                           <a:ea typeface="Malgun Gothic Semilight" panose="020B0503020000020004" pitchFamily="34" charset="-127"/>
                           <a:cs typeface="Malgun Gothic Semilight" panose="020B0503020000020004" pitchFamily="34" charset="-127"/>
                         </a:rPr>
-                        <a:t>/subscribe/system/private/{ownerId}</a:t>
+                        <a:t>/subscribe/private/{ownerId}</a:t>
                       </a:r>
                     </a:p>
                   </a:txBody>
@@ -7398,7 +7398,7 @@
                           <a:ea typeface="Malgun Gothic Semilight" panose="020B0503020000020004" pitchFamily="34" charset="-127"/>
                           <a:cs typeface="Malgun Gothic Semilight" panose="020B0503020000020004" pitchFamily="34" charset="-127"/>
                         </a:rPr>
-                        <a:t>/subscribe/system/public/{roomId}</a:t>
+                        <a:t>/subscribe/public/{roomId}</a:t>
                       </a:r>
                     </a:p>
                   </a:txBody>
@@ -16142,7 +16142,7 @@
           <p:nvPr>
             <p:extLst>
               <p:ext uri="{D42A27DB-BD31-4B8C-83A1-F6EECF244321}">
-                <p14:modId xmlns:p14="http://schemas.microsoft.com/office/powerpoint/2010/main" val="1882569141"/>
+                <p14:modId xmlns:p14="http://schemas.microsoft.com/office/powerpoint/2010/main" val="3180447680"/>
               </p:ext>
             </p:extLst>
           </p:nvPr>
@@ -16279,7 +16279,7 @@
                           <a:ea typeface="Malgun Gothic Semilight" panose="020B0503020000020004" pitchFamily="34" charset="-127"/>
                           <a:cs typeface="Malgun Gothic Semilight" panose="020B0503020000020004" pitchFamily="34" charset="-127"/>
                         </a:rPr>
-                        <a:t>/publish/system/private/{roomId}</a:t>
+                        <a:t>/publish/private/{roomId}</a:t>
                       </a:r>
                     </a:p>
                   </a:txBody>
@@ -16424,7 +16424,7 @@
                           <a:ea typeface="Malgun Gothic Semilight" panose="020B0503020000020004" pitchFamily="34" charset="-127"/>
                           <a:cs typeface="Malgun Gothic Semilight" panose="020B0503020000020004" pitchFamily="34" charset="-127"/>
                         </a:rPr>
-                        <a:t>/subscribe/system/public/{roomId}</a:t>
+                        <a:t>/subscribe/public/{roomId}</a:t>
                       </a:r>
                     </a:p>
                   </a:txBody>
@@ -16924,7 +16924,7 @@
                           <a:ea typeface="Malgun Gothic Semilight" panose="020B0503020000020004" pitchFamily="34" charset="-127"/>
                           <a:cs typeface="Malgun Gothic Semilight" panose="020B0503020000020004" pitchFamily="34" charset="-127"/>
                         </a:rPr>
-                        <a:t>/publish/system/private/{roomId}</a:t>
+                        <a:t>/publish/private/{roomId}</a:t>
                       </a:r>
                     </a:p>
                   </a:txBody>
@@ -17189,7 +17189,7 @@
                           <a:ea typeface="Malgun Gothic Semilight" panose="020B0503020000020004" pitchFamily="34" charset="-127"/>
                           <a:cs typeface="Malgun Gothic Semilight" panose="020B0503020000020004" pitchFamily="34" charset="-127"/>
                         </a:rPr>
-                        <a:t>/subscribe/system/public/{roomId}</a:t>
+                        <a:t>/subscribe/public/{roomId}</a:t>
                       </a:r>
                     </a:p>
                   </a:txBody>
@@ -18080,7 +18080,7 @@
                           <a:ea typeface="Malgun Gothic Semilight" panose="020B0503020000020004" pitchFamily="34" charset="-127"/>
                           <a:cs typeface="Malgun Gothic Semilight" panose="020B0503020000020004" pitchFamily="34" charset="-127"/>
                         </a:rPr>
-                        <a:t>/publish/system/private/{roomId}</a:t>
+                        <a:t>/publish/private/{roomId}</a:t>
                       </a:r>
                     </a:p>
                   </a:txBody>
@@ -18244,7 +18244,7 @@
                           <a:ea typeface="Malgun Gothic Semilight" panose="020B0503020000020004" pitchFamily="34" charset="-127"/>
                           <a:cs typeface="Malgun Gothic Semilight" panose="020B0503020000020004" pitchFamily="34" charset="-127"/>
                         </a:rPr>
-                        <a:t>/subscribe/system/public/{roomId}</a:t>
+                        <a:t>/subscribe/public/{roomId}</a:t>
                       </a:r>
                     </a:p>
                   </a:txBody>
@@ -18718,7 +18718,7 @@
                           <a:ea typeface="Malgun Gothic Semilight" panose="020B0503020000020004" pitchFamily="34" charset="-127"/>
                           <a:cs typeface="Malgun Gothic Semilight" panose="020B0503020000020004" pitchFamily="34" charset="-127"/>
                         </a:rPr>
-                        <a:t>/publish/system/private/{roomId}</a:t>
+                        <a:t>/publish/private/{roomId}</a:t>
                       </a:r>
                     </a:p>
                   </a:txBody>
@@ -18882,7 +18882,7 @@
                           <a:ea typeface="Malgun Gothic Semilight" panose="020B0503020000020004" pitchFamily="34" charset="-127"/>
                           <a:cs typeface="Malgun Gothic Semilight" panose="020B0503020000020004" pitchFamily="34" charset="-127"/>
                         </a:rPr>
-                        <a:t>/subscribe/system/public/{roomId}</a:t>
+                        <a:t>/subscribe/public/{roomId}</a:t>
                       </a:r>
                     </a:p>
                   </a:txBody>
@@ -19452,7 +19452,7 @@
                           <a:ea typeface="Malgun Gothic Semilight" panose="020B0503020000020004" pitchFamily="34" charset="-127"/>
                           <a:cs typeface="Malgun Gothic Semilight" panose="020B0503020000020004" pitchFamily="34" charset="-127"/>
                         </a:rPr>
-                        <a:t>/publish/system/private/{roomId}</a:t>
+                        <a:t>/publish/private/{roomId}</a:t>
                       </a:r>
                     </a:p>
                   </a:txBody>
@@ -19616,7 +19616,7 @@
                           <a:ea typeface="Malgun Gothic Semilight" panose="020B0503020000020004" pitchFamily="34" charset="-127"/>
                           <a:cs typeface="Malgun Gothic Semilight" panose="020B0503020000020004" pitchFamily="34" charset="-127"/>
                         </a:rPr>
-                        <a:t>/subscribe/system/public/{roomId}</a:t>
+                        <a:t>/subscribe/public/{roomId}</a:t>
                       </a:r>
                     </a:p>
                   </a:txBody>

</xml_diff>